<commit_message>
Step by step guide
</commit_message>
<xml_diff>
--- a/massPix_quickstart.pptx
+++ b/massPix_quickstart.pptx
@@ -275,7 +275,7 @@
           <a:p>
             <a:fld id="{2A27EDB3-DB67-4E38-BFBE-E3054BAC1D0F}" type="datetimeFigureOut">
               <a:rPr lang="en-GB" smtClean="0"/>
-              <a:t>29/06/2017</a:t>
+              <a:t>04/07/2017</a:t>
             </a:fld>
             <a:endParaRPr lang="en-GB"/>
           </a:p>
@@ -445,7 +445,7 @@
           <a:p>
             <a:fld id="{2A27EDB3-DB67-4E38-BFBE-E3054BAC1D0F}" type="datetimeFigureOut">
               <a:rPr lang="en-GB" smtClean="0"/>
-              <a:t>29/06/2017</a:t>
+              <a:t>04/07/2017</a:t>
             </a:fld>
             <a:endParaRPr lang="en-GB"/>
           </a:p>
@@ -625,7 +625,7 @@
           <a:p>
             <a:fld id="{2A27EDB3-DB67-4E38-BFBE-E3054BAC1D0F}" type="datetimeFigureOut">
               <a:rPr lang="en-GB" smtClean="0"/>
-              <a:t>29/06/2017</a:t>
+              <a:t>04/07/2017</a:t>
             </a:fld>
             <a:endParaRPr lang="en-GB"/>
           </a:p>
@@ -795,7 +795,7 @@
           <a:p>
             <a:fld id="{2A27EDB3-DB67-4E38-BFBE-E3054BAC1D0F}" type="datetimeFigureOut">
               <a:rPr lang="en-GB" smtClean="0"/>
-              <a:t>29/06/2017</a:t>
+              <a:t>04/07/2017</a:t>
             </a:fld>
             <a:endParaRPr lang="en-GB"/>
           </a:p>
@@ -1041,7 +1041,7 @@
           <a:p>
             <a:fld id="{2A27EDB3-DB67-4E38-BFBE-E3054BAC1D0F}" type="datetimeFigureOut">
               <a:rPr lang="en-GB" smtClean="0"/>
-              <a:t>29/06/2017</a:t>
+              <a:t>04/07/2017</a:t>
             </a:fld>
             <a:endParaRPr lang="en-GB"/>
           </a:p>
@@ -1273,7 +1273,7 @@
           <a:p>
             <a:fld id="{2A27EDB3-DB67-4E38-BFBE-E3054BAC1D0F}" type="datetimeFigureOut">
               <a:rPr lang="en-GB" smtClean="0"/>
-              <a:t>29/06/2017</a:t>
+              <a:t>04/07/2017</a:t>
             </a:fld>
             <a:endParaRPr lang="en-GB"/>
           </a:p>
@@ -1640,7 +1640,7 @@
           <a:p>
             <a:fld id="{2A27EDB3-DB67-4E38-BFBE-E3054BAC1D0F}" type="datetimeFigureOut">
               <a:rPr lang="en-GB" smtClean="0"/>
-              <a:t>29/06/2017</a:t>
+              <a:t>04/07/2017</a:t>
             </a:fld>
             <a:endParaRPr lang="en-GB"/>
           </a:p>
@@ -1758,7 +1758,7 @@
           <a:p>
             <a:fld id="{2A27EDB3-DB67-4E38-BFBE-E3054BAC1D0F}" type="datetimeFigureOut">
               <a:rPr lang="en-GB" smtClean="0"/>
-              <a:t>29/06/2017</a:t>
+              <a:t>04/07/2017</a:t>
             </a:fld>
             <a:endParaRPr lang="en-GB"/>
           </a:p>
@@ -1853,7 +1853,7 @@
           <a:p>
             <a:fld id="{2A27EDB3-DB67-4E38-BFBE-E3054BAC1D0F}" type="datetimeFigureOut">
               <a:rPr lang="en-GB" smtClean="0"/>
-              <a:t>29/06/2017</a:t>
+              <a:t>04/07/2017</a:t>
             </a:fld>
             <a:endParaRPr lang="en-GB"/>
           </a:p>
@@ -2130,7 +2130,7 @@
           <a:p>
             <a:fld id="{2A27EDB3-DB67-4E38-BFBE-E3054BAC1D0F}" type="datetimeFigureOut">
               <a:rPr lang="en-GB" smtClean="0"/>
-              <a:t>29/06/2017</a:t>
+              <a:t>04/07/2017</a:t>
             </a:fld>
             <a:endParaRPr lang="en-GB"/>
           </a:p>
@@ -2383,7 +2383,7 @@
           <a:p>
             <a:fld id="{2A27EDB3-DB67-4E38-BFBE-E3054BAC1D0F}" type="datetimeFigureOut">
               <a:rPr lang="en-GB" smtClean="0"/>
-              <a:t>29/06/2017</a:t>
+              <a:t>04/07/2017</a:t>
             </a:fld>
             <a:endParaRPr lang="en-GB"/>
           </a:p>
@@ -2596,7 +2596,7 @@
           <a:p>
             <a:fld id="{2A27EDB3-DB67-4E38-BFBE-E3054BAC1D0F}" type="datetimeFigureOut">
               <a:rPr lang="en-GB" smtClean="0"/>
-              <a:t>29/06/2017</a:t>
+              <a:t>04/07/2017</a:t>
             </a:fld>
             <a:endParaRPr lang="en-GB"/>
           </a:p>
@@ -3025,7 +3025,7 @@
           <a:p>
             <a:pPr algn="ctr"/>
             <a:r>
-              <a:rPr lang="en-GB" sz="3000" b="1" dirty="0" err="1" smtClean="0"/>
+              <a:rPr lang="en-GB" sz="3000" b="1" smtClean="0"/>
               <a:t>massPix</a:t>
             </a:r>
             <a:endParaRPr lang="en-GB" sz="3000" b="1" dirty="0" smtClean="0"/>
@@ -6597,7 +6597,6 @@
               <a:rPr lang="en-GB" u="sng" dirty="0" smtClean="0"/>
               <a:t> repository. </a:t>
             </a:r>
-            <a:endParaRPr lang="en-GB" u="sng" dirty="0" smtClean="0"/>
           </a:p>
           <a:p>
             <a:endParaRPr lang="en-GB" u="sng" dirty="0"/>

</xml_diff>